<commit_message>
LearnKnit header 디자인 완료
- react-icon 설치
- header 디자인 완료
</commit_message>
<xml_diff>
--- a/LearnKnit/public/assets/기획서.pptx
+++ b/LearnKnit/public/assets/기획서.pptx
@@ -104,6 +104,11 @@
       </a:defRPr>
     </a:lvl9pPr>
   </p:defaultTextStyle>
+  <p:extLst>
+    <p:ext uri="{EFAFB233-063F-42B5-8137-9DF3F51BA10A}">
+      <p15:sldGuideLst xmlns:p15="http://schemas.microsoft.com/office/powerpoint/2012/main"/>
+    </p:ext>
+  </p:extLst>
 </p:presentation>
 </file>
 
@@ -3553,50 +3558,6 @@
       </p:sp>
       <p:sp>
         <p:nvSpPr>
-          <p:cNvPr id="9" name="TextBox 8">
-            <a:extLst>
-              <a:ext uri="{FF2B5EF4-FFF2-40B4-BE49-F238E27FC236}">
-                <a16:creationId xmlns:a16="http://schemas.microsoft.com/office/drawing/2014/main" id="{4580E750-EA36-90BA-112C-DCE086054732}"/>
-              </a:ext>
-            </a:extLst>
-          </p:cNvPr>
-          <p:cNvSpPr txBox="1"/>
-          <p:nvPr/>
-        </p:nvSpPr>
-        <p:spPr>
-          <a:xfrm>
-            <a:off x="10281820" y="143808"/>
-            <a:ext cx="1910179" cy="369332"/>
-          </a:xfrm>
-          <a:prstGeom prst="rect">
-            <a:avLst/>
-          </a:prstGeom>
-          <a:noFill/>
-        </p:spPr>
-        <p:txBody>
-          <a:bodyPr wrap="square" rtlCol="0">
-            <a:spAutoFit/>
-          </a:bodyPr>
-          <a:lstStyle/>
-          <a:p>
-            <a:pPr algn="ctr"/>
-            <a:r>
-              <a:rPr lang="ko-KR" altLang="en-US" dirty="0"/>
-              <a:t>코바늘 </a:t>
-            </a:r>
-            <a:r>
-              <a:rPr lang="en-US" altLang="ko-KR" dirty="0"/>
-              <a:t>| </a:t>
-            </a:r>
-            <a:r>
-              <a:rPr lang="ko-KR" altLang="en-US" dirty="0"/>
-              <a:t>대바늘</a:t>
-            </a:r>
-          </a:p>
-        </p:txBody>
-      </p:sp>
-      <p:sp>
-        <p:nvSpPr>
           <p:cNvPr id="10" name="직사각형 9">
             <a:extLst>
               <a:ext uri="{FF2B5EF4-FFF2-40B4-BE49-F238E27FC236}">
@@ -3910,7 +3871,7 @@
             </a:r>
             <a:r>
               <a:rPr lang="ko-KR" altLang="en-US" dirty="0"/>
-              <a:t>기초</a:t>
+              <a:t>코바늘 기초</a:t>
             </a:r>
           </a:p>
         </p:txBody>
@@ -4204,8 +4165,431 @@
             </a:r>
             <a:r>
               <a:rPr lang="ko-KR" altLang="en-US" dirty="0"/>
-              <a:t>고급</a:t>
-            </a:r>
+              <a:t>코바늘 고급</a:t>
+            </a:r>
+          </a:p>
+        </p:txBody>
+      </p:sp>
+      <p:sp>
+        <p:nvSpPr>
+          <p:cNvPr id="2" name="사각형: 둥근 모서리 1">
+            <a:extLst>
+              <a:ext uri="{FF2B5EF4-FFF2-40B4-BE49-F238E27FC236}">
+                <a16:creationId xmlns:a16="http://schemas.microsoft.com/office/drawing/2014/main" id="{74FDBC93-2A56-5A99-9E4C-BF2CFCEE7ED6}"/>
+              </a:ext>
+            </a:extLst>
+          </p:cNvPr>
+          <p:cNvSpPr/>
+          <p:nvPr/>
+        </p:nvSpPr>
+        <p:spPr>
+          <a:xfrm>
+            <a:off x="1458095" y="95437"/>
+            <a:ext cx="1910179" cy="451651"/>
+          </a:xfrm>
+          <a:prstGeom prst="roundRect">
+            <a:avLst>
+              <a:gd name="adj" fmla="val 50000"/>
+            </a:avLst>
+          </a:prstGeom>
+        </p:spPr>
+        <p:style>
+          <a:lnRef idx="2">
+            <a:schemeClr val="dk1"/>
+          </a:lnRef>
+          <a:fillRef idx="1">
+            <a:schemeClr val="lt1"/>
+          </a:fillRef>
+          <a:effectRef idx="0">
+            <a:schemeClr val="dk1"/>
+          </a:effectRef>
+          <a:fontRef idx="minor">
+            <a:schemeClr val="dk1"/>
+          </a:fontRef>
+        </p:style>
+        <p:txBody>
+          <a:bodyPr rtlCol="0" anchor="ctr"/>
+          <a:lstStyle/>
+          <a:p>
+            <a:pPr algn="ctr"/>
+            <a:r>
+              <a:rPr lang="ko-KR" altLang="en-US" sz="1100" dirty="0"/>
+              <a:t>메뉴 숨기기</a:t>
+            </a:r>
+          </a:p>
+        </p:txBody>
+      </p:sp>
+      <p:sp>
+        <p:nvSpPr>
+          <p:cNvPr id="26" name="타원 25">
+            <a:extLst>
+              <a:ext uri="{FF2B5EF4-FFF2-40B4-BE49-F238E27FC236}">
+                <a16:creationId xmlns:a16="http://schemas.microsoft.com/office/drawing/2014/main" id="{34AC474D-CEA8-645F-7907-2C55378744B3}"/>
+              </a:ext>
+            </a:extLst>
+          </p:cNvPr>
+          <p:cNvSpPr/>
+          <p:nvPr/>
+        </p:nvSpPr>
+        <p:spPr>
+          <a:xfrm>
+            <a:off x="1541736" y="145479"/>
+            <a:ext cx="343102" cy="343102"/>
+          </a:xfrm>
+          <a:prstGeom prst="ellipse">
+            <a:avLst/>
+          </a:prstGeom>
+        </p:spPr>
+        <p:style>
+          <a:lnRef idx="2">
+            <a:schemeClr val="dk1"/>
+          </a:lnRef>
+          <a:fillRef idx="1">
+            <a:schemeClr val="lt1"/>
+          </a:fillRef>
+          <a:effectRef idx="0">
+            <a:schemeClr val="dk1"/>
+          </a:effectRef>
+          <a:fontRef idx="minor">
+            <a:schemeClr val="dk1"/>
+          </a:fontRef>
+        </p:style>
+        <p:txBody>
+          <a:bodyPr rtlCol="0" anchor="ctr"/>
+          <a:lstStyle/>
+          <a:p>
+            <a:pPr algn="ctr"/>
+            <a:endParaRPr lang="ko-KR" altLang="en-US"/>
+          </a:p>
+        </p:txBody>
+      </p:sp>
+      <p:sp>
+        <p:nvSpPr>
+          <p:cNvPr id="11" name="사각형: 둥근 모서리 10">
+            <a:extLst>
+              <a:ext uri="{FF2B5EF4-FFF2-40B4-BE49-F238E27FC236}">
+                <a16:creationId xmlns:a16="http://schemas.microsoft.com/office/drawing/2014/main" id="{0037615F-38AD-6254-A3CB-2715FF3CFACF}"/>
+              </a:ext>
+            </a:extLst>
+          </p:cNvPr>
+          <p:cNvSpPr/>
+          <p:nvPr/>
+        </p:nvSpPr>
+        <p:spPr>
+          <a:xfrm>
+            <a:off x="3619744" y="95437"/>
+            <a:ext cx="1910179" cy="451651"/>
+          </a:xfrm>
+          <a:prstGeom prst="roundRect">
+            <a:avLst>
+              <a:gd name="adj" fmla="val 50000"/>
+            </a:avLst>
+          </a:prstGeom>
+        </p:spPr>
+        <p:style>
+          <a:lnRef idx="2">
+            <a:schemeClr val="dk1"/>
+          </a:lnRef>
+          <a:fillRef idx="1">
+            <a:schemeClr val="lt1"/>
+          </a:fillRef>
+          <a:effectRef idx="0">
+            <a:schemeClr val="dk1"/>
+          </a:effectRef>
+          <a:fontRef idx="minor">
+            <a:schemeClr val="dk1"/>
+          </a:fontRef>
+        </p:style>
+        <p:txBody>
+          <a:bodyPr rtlCol="0" anchor="ctr"/>
+          <a:lstStyle/>
+          <a:p>
+            <a:pPr algn="ctr"/>
+            <a:r>
+              <a:rPr lang="ko-KR" altLang="en-US" sz="1100" dirty="0"/>
+              <a:t>이전 영상</a:t>
+            </a:r>
+          </a:p>
+        </p:txBody>
+      </p:sp>
+      <p:sp>
+        <p:nvSpPr>
+          <p:cNvPr id="3" name="곱하기 기호 2">
+            <a:extLst>
+              <a:ext uri="{FF2B5EF4-FFF2-40B4-BE49-F238E27FC236}">
+                <a16:creationId xmlns:a16="http://schemas.microsoft.com/office/drawing/2014/main" id="{7B09A7C4-3D3D-01D8-533C-FDACE5B7E4F7}"/>
+              </a:ext>
+            </a:extLst>
+          </p:cNvPr>
+          <p:cNvSpPr/>
+          <p:nvPr/>
+        </p:nvSpPr>
+        <p:spPr>
+          <a:xfrm>
+            <a:off x="1614502" y="225845"/>
+            <a:ext cx="197569" cy="197569"/>
+          </a:xfrm>
+          <a:prstGeom prst="mathMultiply">
+            <a:avLst>
+              <a:gd name="adj1" fmla="val 12545"/>
+            </a:avLst>
+          </a:prstGeom>
+        </p:spPr>
+        <p:style>
+          <a:lnRef idx="2">
+            <a:schemeClr val="dk1"/>
+          </a:lnRef>
+          <a:fillRef idx="1">
+            <a:schemeClr val="lt1"/>
+          </a:fillRef>
+          <a:effectRef idx="0">
+            <a:schemeClr val="dk1"/>
+          </a:effectRef>
+          <a:fontRef idx="minor">
+            <a:schemeClr val="dk1"/>
+          </a:fontRef>
+        </p:style>
+        <p:txBody>
+          <a:bodyPr rtlCol="0" anchor="ctr"/>
+          <a:lstStyle/>
+          <a:p>
+            <a:pPr algn="ctr"/>
+            <a:endParaRPr lang="ko-KR" altLang="en-US"/>
+          </a:p>
+        </p:txBody>
+      </p:sp>
+      <p:sp>
+        <p:nvSpPr>
+          <p:cNvPr id="27" name="타원 26">
+            <a:extLst>
+              <a:ext uri="{FF2B5EF4-FFF2-40B4-BE49-F238E27FC236}">
+                <a16:creationId xmlns:a16="http://schemas.microsoft.com/office/drawing/2014/main" id="{104F8BDF-2D95-8C1C-745A-439D78FC7C49}"/>
+              </a:ext>
+            </a:extLst>
+          </p:cNvPr>
+          <p:cNvSpPr/>
+          <p:nvPr/>
+        </p:nvSpPr>
+        <p:spPr>
+          <a:xfrm>
+            <a:off x="3692846" y="145479"/>
+            <a:ext cx="343102" cy="343102"/>
+          </a:xfrm>
+          <a:prstGeom prst="ellipse">
+            <a:avLst/>
+          </a:prstGeom>
+        </p:spPr>
+        <p:style>
+          <a:lnRef idx="2">
+            <a:schemeClr val="dk1"/>
+          </a:lnRef>
+          <a:fillRef idx="1">
+            <a:schemeClr val="lt1"/>
+          </a:fillRef>
+          <a:effectRef idx="0">
+            <a:schemeClr val="dk1"/>
+          </a:effectRef>
+          <a:fontRef idx="minor">
+            <a:schemeClr val="dk1"/>
+          </a:fontRef>
+        </p:style>
+        <p:txBody>
+          <a:bodyPr rtlCol="0" anchor="ctr"/>
+          <a:lstStyle/>
+          <a:p>
+            <a:pPr algn="ctr"/>
+            <a:endParaRPr lang="ko-KR" altLang="en-US"/>
+          </a:p>
+        </p:txBody>
+      </p:sp>
+      <p:sp>
+        <p:nvSpPr>
+          <p:cNvPr id="29" name="화살표: 왼쪽 28">
+            <a:extLst>
+              <a:ext uri="{FF2B5EF4-FFF2-40B4-BE49-F238E27FC236}">
+                <a16:creationId xmlns:a16="http://schemas.microsoft.com/office/drawing/2014/main" id="{79C2F660-5DA9-801E-0E9F-23D1E4C00386}"/>
+              </a:ext>
+            </a:extLst>
+          </p:cNvPr>
+          <p:cNvSpPr/>
+          <p:nvPr/>
+        </p:nvSpPr>
+        <p:spPr>
+          <a:xfrm>
+            <a:off x="3807899" y="279723"/>
+            <a:ext cx="112996" cy="74613"/>
+          </a:xfrm>
+          <a:prstGeom prst="leftArrow">
+            <a:avLst>
+              <a:gd name="adj1" fmla="val 28726"/>
+              <a:gd name="adj2" fmla="val 50000"/>
+            </a:avLst>
+          </a:prstGeom>
+        </p:spPr>
+        <p:style>
+          <a:lnRef idx="2">
+            <a:schemeClr val="dk1"/>
+          </a:lnRef>
+          <a:fillRef idx="1">
+            <a:schemeClr val="lt1"/>
+          </a:fillRef>
+          <a:effectRef idx="0">
+            <a:schemeClr val="dk1"/>
+          </a:effectRef>
+          <a:fontRef idx="minor">
+            <a:schemeClr val="dk1"/>
+          </a:fontRef>
+        </p:style>
+        <p:txBody>
+          <a:bodyPr rtlCol="0" anchor="ctr"/>
+          <a:lstStyle/>
+          <a:p>
+            <a:pPr algn="ctr"/>
+            <a:endParaRPr lang="ko-KR" altLang="en-US"/>
+          </a:p>
+        </p:txBody>
+      </p:sp>
+      <p:sp>
+        <p:nvSpPr>
+          <p:cNvPr id="30" name="사각형: 둥근 모서리 29">
+            <a:extLst>
+              <a:ext uri="{FF2B5EF4-FFF2-40B4-BE49-F238E27FC236}">
+                <a16:creationId xmlns:a16="http://schemas.microsoft.com/office/drawing/2014/main" id="{74E7483A-F79C-A3CF-7B92-FF25BE8E120B}"/>
+              </a:ext>
+            </a:extLst>
+          </p:cNvPr>
+          <p:cNvSpPr/>
+          <p:nvPr/>
+        </p:nvSpPr>
+        <p:spPr>
+          <a:xfrm>
+            <a:off x="10124004" y="102648"/>
+            <a:ext cx="1910179" cy="451651"/>
+          </a:xfrm>
+          <a:prstGeom prst="roundRect">
+            <a:avLst>
+              <a:gd name="adj" fmla="val 50000"/>
+            </a:avLst>
+          </a:prstGeom>
+        </p:spPr>
+        <p:style>
+          <a:lnRef idx="2">
+            <a:schemeClr val="dk1"/>
+          </a:lnRef>
+          <a:fillRef idx="1">
+            <a:schemeClr val="lt1"/>
+          </a:fillRef>
+          <a:effectRef idx="0">
+            <a:schemeClr val="dk1"/>
+          </a:effectRef>
+          <a:fontRef idx="minor">
+            <a:schemeClr val="dk1"/>
+          </a:fontRef>
+        </p:style>
+        <p:txBody>
+          <a:bodyPr rtlCol="0" anchor="ctr"/>
+          <a:lstStyle/>
+          <a:p>
+            <a:pPr algn="ctr"/>
+            <a:r>
+              <a:rPr lang="ko-KR" altLang="en-US" sz="1100"/>
+              <a:t>다음 </a:t>
+            </a:r>
+            <a:r>
+              <a:rPr lang="ko-KR" altLang="en-US" sz="1100" dirty="0"/>
+              <a:t>영상</a:t>
+            </a:r>
+          </a:p>
+        </p:txBody>
+      </p:sp>
+      <p:sp>
+        <p:nvSpPr>
+          <p:cNvPr id="31" name="타원 30">
+            <a:extLst>
+              <a:ext uri="{FF2B5EF4-FFF2-40B4-BE49-F238E27FC236}">
+                <a16:creationId xmlns:a16="http://schemas.microsoft.com/office/drawing/2014/main" id="{75978EC6-B39E-EFB8-003C-582ABCA06BBD}"/>
+              </a:ext>
+            </a:extLst>
+          </p:cNvPr>
+          <p:cNvSpPr/>
+          <p:nvPr/>
+        </p:nvSpPr>
+        <p:spPr>
+          <a:xfrm flipH="1">
+            <a:off x="11619506" y="145479"/>
+            <a:ext cx="343102" cy="343102"/>
+          </a:xfrm>
+          <a:prstGeom prst="ellipse">
+            <a:avLst/>
+          </a:prstGeom>
+        </p:spPr>
+        <p:style>
+          <a:lnRef idx="2">
+            <a:schemeClr val="dk1"/>
+          </a:lnRef>
+          <a:fillRef idx="1">
+            <a:schemeClr val="lt1"/>
+          </a:fillRef>
+          <a:effectRef idx="0">
+            <a:schemeClr val="dk1"/>
+          </a:effectRef>
+          <a:fontRef idx="minor">
+            <a:schemeClr val="dk1"/>
+          </a:fontRef>
+        </p:style>
+        <p:txBody>
+          <a:bodyPr rtlCol="0" anchor="ctr"/>
+          <a:lstStyle/>
+          <a:p>
+            <a:pPr algn="ctr"/>
+            <a:endParaRPr lang="ko-KR" altLang="en-US"/>
+          </a:p>
+        </p:txBody>
+      </p:sp>
+      <p:sp>
+        <p:nvSpPr>
+          <p:cNvPr id="32" name="화살표: 왼쪽 31">
+            <a:extLst>
+              <a:ext uri="{FF2B5EF4-FFF2-40B4-BE49-F238E27FC236}">
+                <a16:creationId xmlns:a16="http://schemas.microsoft.com/office/drawing/2014/main" id="{7AC05633-1EFD-3561-B599-F2944966F9A3}"/>
+              </a:ext>
+            </a:extLst>
+          </p:cNvPr>
+          <p:cNvSpPr/>
+          <p:nvPr/>
+        </p:nvSpPr>
+        <p:spPr>
+          <a:xfrm flipH="1">
+            <a:off x="11734559" y="279723"/>
+            <a:ext cx="112996" cy="74613"/>
+          </a:xfrm>
+          <a:prstGeom prst="leftArrow">
+            <a:avLst>
+              <a:gd name="adj1" fmla="val 28726"/>
+              <a:gd name="adj2" fmla="val 50000"/>
+            </a:avLst>
+          </a:prstGeom>
+        </p:spPr>
+        <p:style>
+          <a:lnRef idx="2">
+            <a:schemeClr val="dk1"/>
+          </a:lnRef>
+          <a:fillRef idx="1">
+            <a:schemeClr val="lt1"/>
+          </a:fillRef>
+          <a:effectRef idx="0">
+            <a:schemeClr val="dk1"/>
+          </a:effectRef>
+          <a:fontRef idx="minor">
+            <a:schemeClr val="dk1"/>
+          </a:fontRef>
+        </p:style>
+        <p:txBody>
+          <a:bodyPr rtlCol="0" anchor="ctr"/>
+          <a:lstStyle/>
+          <a:p>
+            <a:pPr algn="ctr"/>
+            <a:endParaRPr lang="ko-KR" altLang="en-US"/>
           </a:p>
         </p:txBody>
       </p:sp>

</xml_diff>